<commit_message>
doc(./presentation.*): fixed mistypes. added pdf version of presentation
</commit_message>
<xml_diff>
--- a/presentation3.pptx
+++ b/presentation3.pptx
@@ -342,7 +342,7 @@
             <a:fld id="{5586B75A-687E-405C-8A0B-8D00578BA2C3}" type="datetimeFigureOut">
               <a:rPr lang="en-US" dirty="0"/>
               <a:pPr/>
-              <a:t>11/30/2021</a:t>
+              <a:t>12/5/2021</a:t>
             </a:fld>
             <a:endParaRPr lang="en-US" dirty="0"/>
           </a:p>
@@ -509,7 +509,7 @@
             <a:fld id="{5586B75A-687E-405C-8A0B-8D00578BA2C3}" type="datetimeFigureOut">
               <a:rPr lang="en-US" dirty="0"/>
               <a:pPr/>
-              <a:t>11/30/2021</a:t>
+              <a:t>12/5/2021</a:t>
             </a:fld>
             <a:endParaRPr lang="en-US" dirty="0"/>
           </a:p>
@@ -686,7 +686,7 @@
             <a:fld id="{5586B75A-687E-405C-8A0B-8D00578BA2C3}" type="datetimeFigureOut">
               <a:rPr lang="en-US" dirty="0"/>
               <a:pPr/>
-              <a:t>11/30/2021</a:t>
+              <a:t>12/5/2021</a:t>
             </a:fld>
             <a:endParaRPr lang="en-US" dirty="0"/>
           </a:p>
@@ -853,7 +853,7 @@
             <a:fld id="{5586B75A-687E-405C-8A0B-8D00578BA2C3}" type="datetimeFigureOut">
               <a:rPr lang="en-US" dirty="0"/>
               <a:pPr/>
-              <a:t>11/30/2021</a:t>
+              <a:t>12/5/2021</a:t>
             </a:fld>
             <a:endParaRPr lang="en-US" dirty="0"/>
           </a:p>
@@ -1108,7 +1108,7 @@
             <a:fld id="{5586B75A-687E-405C-8A0B-8D00578BA2C3}" type="datetimeFigureOut">
               <a:rPr lang="en-US" dirty="0"/>
               <a:pPr/>
-              <a:t>11/30/2021</a:t>
+              <a:t>12/5/2021</a:t>
             </a:fld>
             <a:endParaRPr lang="en-US" dirty="0"/>
           </a:p>
@@ -1393,7 +1393,7 @@
             <a:fld id="{5586B75A-687E-405C-8A0B-8D00578BA2C3}" type="datetimeFigureOut">
               <a:rPr lang="en-US" dirty="0"/>
               <a:pPr/>
-              <a:t>11/30/2021</a:t>
+              <a:t>12/5/2021</a:t>
             </a:fld>
             <a:endParaRPr lang="en-US" dirty="0"/>
           </a:p>
@@ -1832,7 +1832,7 @@
             <a:fld id="{5586B75A-687E-405C-8A0B-8D00578BA2C3}" type="datetimeFigureOut">
               <a:rPr lang="en-US" dirty="0"/>
               <a:pPr/>
-              <a:t>11/30/2021</a:t>
+              <a:t>12/5/2021</a:t>
             </a:fld>
             <a:endParaRPr lang="en-US" dirty="0"/>
           </a:p>
@@ -1947,7 +1947,7 @@
             <a:fld id="{5586B75A-687E-405C-8A0B-8D00578BA2C3}" type="datetimeFigureOut">
               <a:rPr lang="en-US" dirty="0"/>
               <a:pPr/>
-              <a:t>11/30/2021</a:t>
+              <a:t>12/5/2021</a:t>
             </a:fld>
             <a:endParaRPr lang="en-US" dirty="0"/>
           </a:p>
@@ -2039,7 +2039,7 @@
             <a:fld id="{5586B75A-687E-405C-8A0B-8D00578BA2C3}" type="datetimeFigureOut">
               <a:rPr lang="en-US" dirty="0"/>
               <a:pPr/>
-              <a:t>11/30/2021</a:t>
+              <a:t>12/5/2021</a:t>
             </a:fld>
             <a:endParaRPr lang="en-US" dirty="0"/>
           </a:p>
@@ -2324,7 +2324,7 @@
             <a:fld id="{5586B75A-687E-405C-8A0B-8D00578BA2C3}" type="datetimeFigureOut">
               <a:rPr lang="en-US" dirty="0"/>
               <a:pPr/>
-              <a:t>11/30/2021</a:t>
+              <a:t>12/5/2021</a:t>
             </a:fld>
             <a:endParaRPr lang="en-US" dirty="0"/>
           </a:p>
@@ -2594,7 +2594,7 @@
             <a:fld id="{5586B75A-687E-405C-8A0B-8D00578BA2C3}" type="datetimeFigureOut">
               <a:rPr lang="en-US" dirty="0"/>
               <a:pPr/>
-              <a:t>11/30/2021</a:t>
+              <a:t>12/5/2021</a:t>
             </a:fld>
             <a:endParaRPr lang="en-US" dirty="0"/>
           </a:p>
@@ -2888,7 +2888,7 @@
             <a:fld id="{5586B75A-687E-405C-8A0B-8D00578BA2C3}" type="datetimeFigureOut">
               <a:rPr lang="en-US" dirty="0"/>
               <a:pPr/>
-              <a:t>11/30/2021</a:t>
+              <a:t>12/5/2021</a:t>
             </a:fld>
             <a:endParaRPr lang="en-US" dirty="0"/>
           </a:p>
@@ -3496,21 +3496,7 @@
                 <a:latin typeface="Times New Roman" panose="02020603050405020304" pitchFamily="18" charset="0"/>
                 <a:cs typeface="Times New Roman" panose="02020603050405020304" pitchFamily="18" charset="0"/>
               </a:rPr>
-              <a:t>Проверил: </a:t>
-            </a:r>
-            <a:r>
-              <a:rPr lang="ru-RU" sz="2400" dirty="0" err="1">
-                <a:latin typeface="Times New Roman" panose="02020603050405020304" pitchFamily="18" charset="0"/>
-                <a:cs typeface="Times New Roman" panose="02020603050405020304" pitchFamily="18" charset="0"/>
-              </a:rPr>
-              <a:t>Лапытова</a:t>
-            </a:r>
-            <a:r>
-              <a:rPr lang="ru-RU" sz="2400" dirty="0">
-                <a:latin typeface="Times New Roman" panose="02020603050405020304" pitchFamily="18" charset="0"/>
-                <a:cs typeface="Times New Roman" panose="02020603050405020304" pitchFamily="18" charset="0"/>
-              </a:rPr>
-              <a:t> О. А.</a:t>
+              <a:t>Проверил: Латыпова О. А.</a:t>
             </a:r>
           </a:p>
         </p:txBody>

</xml_diff>